<commit_message>
fixes correct use-case-diagram in ppp
</commit_message>
<xml_diff>
--- a/doc/task02/task02.pptx
+++ b/doc/task02/task02.pptx
@@ -110,6 +110,11 @@
       </a:defRPr>
     </a:lvl9pPr>
   </p:defaultTextStyle>
+  <p:extLst>
+    <p:ext uri="{EFAFB233-063F-42B5-8137-9DF3F51BA10A}">
+      <p15:sldGuideLst xmlns:p15="http://schemas.microsoft.com/office/powerpoint/2012/main"/>
+    </p:ext>
+  </p:extLst>
 </p:presentation>
 </file>
 
@@ -163,7 +168,7 @@
           <a:noFill/>
           <a:extLst>
             <a:ext uri="{909E8E84-426E-40dd-AFC4-6F175D3DCCD1}">
-              <a14:hiddenFill xmlns:a14="http://schemas.microsoft.com/office/drawing/2010/main" xmlns="">
+              <a14:hiddenFill xmlns="" xmlns:a14="http://schemas.microsoft.com/office/drawing/2010/main">
                 <a:solidFill>
                   <a:srgbClr val="FFFFFF"/>
                 </a:solidFill>
@@ -223,7 +228,7 @@
             </a:ln>
             <a:extLst>
               <a:ext uri="{91240B29-F687-4f45-9708-019B960494DF}">
-                <a14:hiddenLine xmlns:a14="http://schemas.microsoft.com/office/drawing/2010/main" xmlns="" w="9525">
+                <a14:hiddenLine xmlns="" xmlns:a14="http://schemas.microsoft.com/office/drawing/2010/main" w="9525">
                   <a:solidFill>
                     <a:srgbClr val="000000"/>
                   </a:solidFill>
@@ -313,7 +318,7 @@
             </a:ln>
             <a:extLst>
               <a:ext uri="{91240B29-F687-4f45-9708-019B960494DF}">
-                <a14:hiddenLine xmlns:a14="http://schemas.microsoft.com/office/drawing/2010/main" xmlns="" w="9525">
+                <a14:hiddenLine xmlns="" xmlns:a14="http://schemas.microsoft.com/office/drawing/2010/main" w="9525">
                   <a:solidFill>
                     <a:srgbClr val="000000"/>
                   </a:solidFill>
@@ -403,7 +408,7 @@
             </a:ln>
             <a:extLst>
               <a:ext uri="{91240B29-F687-4f45-9708-019B960494DF}">
-                <a14:hiddenLine xmlns:a14="http://schemas.microsoft.com/office/drawing/2010/main" xmlns="" w="9525">
+                <a14:hiddenLine xmlns="" xmlns:a14="http://schemas.microsoft.com/office/drawing/2010/main" w="9525">
                   <a:solidFill>
                     <a:srgbClr val="000000"/>
                   </a:solidFill>
@@ -437,7 +442,7 @@
             </a:ln>
             <a:extLst>
               <a:ext uri="{91240B29-F687-4f45-9708-019B960494DF}">
-                <a14:hiddenLine xmlns:a14="http://schemas.microsoft.com/office/drawing/2010/main" xmlns="" w="9525">
+                <a14:hiddenLine xmlns="" xmlns:a14="http://schemas.microsoft.com/office/drawing/2010/main" w="9525">
                   <a:solidFill>
                     <a:srgbClr val="000000"/>
                   </a:solidFill>
@@ -527,7 +532,7 @@
             </a:ln>
             <a:extLst>
               <a:ext uri="{91240B29-F687-4f45-9708-019B960494DF}">
-                <a14:hiddenLine xmlns:a14="http://schemas.microsoft.com/office/drawing/2010/main" xmlns="" w="9525">
+                <a14:hiddenLine xmlns="" xmlns:a14="http://schemas.microsoft.com/office/drawing/2010/main" w="9525">
                   <a:solidFill>
                     <a:srgbClr val="000000"/>
                   </a:solidFill>
@@ -589,7 +594,7 @@
             </a:ln>
             <a:extLst>
               <a:ext uri="{91240B29-F687-4f45-9708-019B960494DF}">
-                <a14:hiddenLine xmlns:a14="http://schemas.microsoft.com/office/drawing/2010/main" xmlns="" w="9525">
+                <a14:hiddenLine xmlns="" xmlns:a14="http://schemas.microsoft.com/office/drawing/2010/main" w="9525">
                   <a:solidFill>
                     <a:srgbClr val="000000"/>
                   </a:solidFill>
@@ -651,7 +656,7 @@
             </a:ln>
             <a:extLst>
               <a:ext uri="{91240B29-F687-4f45-9708-019B960494DF}">
-                <a14:hiddenLine xmlns:a14="http://schemas.microsoft.com/office/drawing/2010/main" xmlns="" w="9525">
+                <a14:hiddenLine xmlns="" xmlns:a14="http://schemas.microsoft.com/office/drawing/2010/main" w="9525">
                   <a:solidFill>
                     <a:srgbClr val="000000"/>
                   </a:solidFill>
@@ -741,7 +746,7 @@
             </a:ln>
             <a:extLst>
               <a:ext uri="{91240B29-F687-4f45-9708-019B960494DF}">
-                <a14:hiddenLine xmlns:a14="http://schemas.microsoft.com/office/drawing/2010/main" xmlns="" w="9525">
+                <a14:hiddenLine xmlns="" xmlns:a14="http://schemas.microsoft.com/office/drawing/2010/main" w="9525">
                   <a:solidFill>
                     <a:srgbClr val="000000"/>
                   </a:solidFill>
@@ -803,7 +808,7 @@
             </a:ln>
             <a:extLst>
               <a:ext uri="{91240B29-F687-4f45-9708-019B960494DF}">
-                <a14:hiddenLine xmlns:a14="http://schemas.microsoft.com/office/drawing/2010/main" xmlns="" w="9525">
+                <a14:hiddenLine xmlns="" xmlns:a14="http://schemas.microsoft.com/office/drawing/2010/main" w="9525">
                   <a:solidFill>
                     <a:srgbClr val="000000"/>
                   </a:solidFill>
@@ -865,7 +870,7 @@
             </a:ln>
             <a:extLst>
               <a:ext uri="{91240B29-F687-4f45-9708-019B960494DF}">
-                <a14:hiddenLine xmlns:a14="http://schemas.microsoft.com/office/drawing/2010/main" xmlns="" w="9525">
+                <a14:hiddenLine xmlns="" xmlns:a14="http://schemas.microsoft.com/office/drawing/2010/main" w="9525">
                   <a:solidFill>
                     <a:srgbClr val="000000"/>
                   </a:solidFill>
@@ -955,7 +960,7 @@
             </a:ln>
             <a:extLst>
               <a:ext uri="{91240B29-F687-4f45-9708-019B960494DF}">
-                <a14:hiddenLine xmlns:a14="http://schemas.microsoft.com/office/drawing/2010/main" xmlns="" w="9525">
+                <a14:hiddenLine xmlns="" xmlns:a14="http://schemas.microsoft.com/office/drawing/2010/main" w="9525">
                   <a:solidFill>
                     <a:srgbClr val="000000"/>
                   </a:solidFill>
@@ -1045,7 +1050,7 @@
             </a:ln>
             <a:extLst>
               <a:ext uri="{91240B29-F687-4f45-9708-019B960494DF}">
-                <a14:hiddenLine xmlns:a14="http://schemas.microsoft.com/office/drawing/2010/main" xmlns="" w="9525">
+                <a14:hiddenLine xmlns="" xmlns:a14="http://schemas.microsoft.com/office/drawing/2010/main" w="9525">
                   <a:solidFill>
                     <a:srgbClr val="000000"/>
                   </a:solidFill>
@@ -1107,7 +1112,7 @@
             </a:ln>
             <a:extLst>
               <a:ext uri="{91240B29-F687-4f45-9708-019B960494DF}">
-                <a14:hiddenLine xmlns:a14="http://schemas.microsoft.com/office/drawing/2010/main" xmlns="" w="9525">
+                <a14:hiddenLine xmlns="" xmlns:a14="http://schemas.microsoft.com/office/drawing/2010/main" w="9525">
                   <a:solidFill>
                     <a:srgbClr val="000000"/>
                   </a:solidFill>
@@ -1217,7 +1222,7 @@
             </a:ln>
             <a:extLst>
               <a:ext uri="{91240B29-F687-4f45-9708-019B960494DF}">
-                <a14:hiddenLine xmlns:a14="http://schemas.microsoft.com/office/drawing/2010/main" xmlns="" w="9525">
+                <a14:hiddenLine xmlns="" xmlns:a14="http://schemas.microsoft.com/office/drawing/2010/main" w="9525">
                   <a:solidFill>
                     <a:srgbClr val="000000"/>
                   </a:solidFill>
@@ -1279,7 +1284,7 @@
             </a:ln>
             <a:extLst>
               <a:ext uri="{91240B29-F687-4f45-9708-019B960494DF}">
-                <a14:hiddenLine xmlns:a14="http://schemas.microsoft.com/office/drawing/2010/main" xmlns="" w="9525">
+                <a14:hiddenLine xmlns="" xmlns:a14="http://schemas.microsoft.com/office/drawing/2010/main" w="9525">
                   <a:solidFill>
                     <a:srgbClr val="000000"/>
                   </a:solidFill>
@@ -1369,7 +1374,7 @@
             </a:ln>
             <a:extLst>
               <a:ext uri="{91240B29-F687-4f45-9708-019B960494DF}">
-                <a14:hiddenLine xmlns:a14="http://schemas.microsoft.com/office/drawing/2010/main" xmlns="" w="9525">
+                <a14:hiddenLine xmlns="" xmlns:a14="http://schemas.microsoft.com/office/drawing/2010/main" w="9525">
                   <a:solidFill>
                     <a:srgbClr val="000000"/>
                   </a:solidFill>
@@ -1459,7 +1464,7 @@
             </a:ln>
             <a:extLst>
               <a:ext uri="{91240B29-F687-4f45-9708-019B960494DF}">
-                <a14:hiddenLine xmlns:a14="http://schemas.microsoft.com/office/drawing/2010/main" xmlns="" w="9525">
+                <a14:hiddenLine xmlns="" xmlns:a14="http://schemas.microsoft.com/office/drawing/2010/main" w="9525">
                   <a:solidFill>
                     <a:srgbClr val="000000"/>
                   </a:solidFill>
@@ -1521,7 +1526,7 @@
             </a:ln>
             <a:extLst>
               <a:ext uri="{91240B29-F687-4f45-9708-019B960494DF}">
-                <a14:hiddenLine xmlns:a14="http://schemas.microsoft.com/office/drawing/2010/main" xmlns="" w="9525">
+                <a14:hiddenLine xmlns="" xmlns:a14="http://schemas.microsoft.com/office/drawing/2010/main" w="9525">
                   <a:solidFill>
                     <a:srgbClr val="000000"/>
                   </a:solidFill>
@@ -1611,7 +1616,7 @@
             </a:ln>
             <a:extLst>
               <a:ext uri="{91240B29-F687-4f45-9708-019B960494DF}">
-                <a14:hiddenLine xmlns:a14="http://schemas.microsoft.com/office/drawing/2010/main" xmlns="" w="9525">
+                <a14:hiddenLine xmlns="" xmlns:a14="http://schemas.microsoft.com/office/drawing/2010/main" w="9525">
                   <a:solidFill>
                     <a:srgbClr val="000000"/>
                   </a:solidFill>
@@ -1701,7 +1706,7 @@
             </a:ln>
             <a:extLst>
               <a:ext uri="{91240B29-F687-4f45-9708-019B960494DF}">
-                <a14:hiddenLine xmlns:a14="http://schemas.microsoft.com/office/drawing/2010/main" xmlns="" w="9525">
+                <a14:hiddenLine xmlns="" xmlns:a14="http://schemas.microsoft.com/office/drawing/2010/main" w="9525">
                   <a:solidFill>
                     <a:srgbClr val="000000"/>
                   </a:solidFill>
@@ -1757,7 +1762,7 @@
             </a:ln>
             <a:extLst>
               <a:ext uri="{91240B29-F687-4f45-9708-019B960494DF}">
-                <a14:hiddenLine xmlns:a14="http://schemas.microsoft.com/office/drawing/2010/main" xmlns="" w="9525">
+                <a14:hiddenLine xmlns="" xmlns:a14="http://schemas.microsoft.com/office/drawing/2010/main" w="9525">
                   <a:solidFill>
                     <a:srgbClr val="000000"/>
                   </a:solidFill>
@@ -1847,7 +1852,7 @@
             </a:ln>
             <a:extLst>
               <a:ext uri="{91240B29-F687-4f45-9708-019B960494DF}">
-                <a14:hiddenLine xmlns:a14="http://schemas.microsoft.com/office/drawing/2010/main" xmlns="" w="9525">
+                <a14:hiddenLine xmlns="" xmlns:a14="http://schemas.microsoft.com/office/drawing/2010/main" w="9525">
                   <a:solidFill>
                     <a:srgbClr val="000000"/>
                   </a:solidFill>
@@ -1903,7 +1908,7 @@
             </a:ln>
             <a:extLst>
               <a:ext uri="{91240B29-F687-4f45-9708-019B960494DF}">
-                <a14:hiddenLine xmlns:a14="http://schemas.microsoft.com/office/drawing/2010/main" xmlns="" w="9525">
+                <a14:hiddenLine xmlns="" xmlns:a14="http://schemas.microsoft.com/office/drawing/2010/main" w="9525">
                   <a:solidFill>
                     <a:srgbClr val="000000"/>
                   </a:solidFill>
@@ -1993,7 +1998,7 @@
             </a:ln>
             <a:extLst>
               <a:ext uri="{91240B29-F687-4f45-9708-019B960494DF}">
-                <a14:hiddenLine xmlns:a14="http://schemas.microsoft.com/office/drawing/2010/main" xmlns="" w="9525">
+                <a14:hiddenLine xmlns="" xmlns:a14="http://schemas.microsoft.com/office/drawing/2010/main" w="9525">
                   <a:solidFill>
                     <a:srgbClr val="000000"/>
                   </a:solidFill>
@@ -2061,7 +2066,7 @@
             </a:ln>
             <a:extLst>
               <a:ext uri="{91240B29-F687-4f45-9708-019B960494DF}">
-                <a14:hiddenLine xmlns:a14="http://schemas.microsoft.com/office/drawing/2010/main" xmlns="" w="9525">
+                <a14:hiddenLine xmlns="" xmlns:a14="http://schemas.microsoft.com/office/drawing/2010/main" w="9525">
                   <a:solidFill>
                     <a:srgbClr val="000000"/>
                   </a:solidFill>
@@ -2151,7 +2156,7 @@
             </a:ln>
             <a:extLst>
               <a:ext uri="{91240B29-F687-4f45-9708-019B960494DF}">
-                <a14:hiddenLine xmlns:a14="http://schemas.microsoft.com/office/drawing/2010/main" xmlns="" w="9525">
+                <a14:hiddenLine xmlns="" xmlns:a14="http://schemas.microsoft.com/office/drawing/2010/main" w="9525">
                   <a:solidFill>
                     <a:srgbClr val="000000"/>
                   </a:solidFill>
@@ -2219,7 +2224,7 @@
             </a:ln>
             <a:extLst>
               <a:ext uri="{91240B29-F687-4f45-9708-019B960494DF}">
-                <a14:hiddenLine xmlns:a14="http://schemas.microsoft.com/office/drawing/2010/main" xmlns="" w="9525">
+                <a14:hiddenLine xmlns="" xmlns:a14="http://schemas.microsoft.com/office/drawing/2010/main" w="9525">
                   <a:solidFill>
                     <a:srgbClr val="000000"/>
                   </a:solidFill>
@@ -2309,7 +2314,7 @@
             </a:ln>
             <a:extLst>
               <a:ext uri="{91240B29-F687-4f45-9708-019B960494DF}">
-                <a14:hiddenLine xmlns:a14="http://schemas.microsoft.com/office/drawing/2010/main" xmlns="" w="9525">
+                <a14:hiddenLine xmlns="" xmlns:a14="http://schemas.microsoft.com/office/drawing/2010/main" w="9525">
                   <a:solidFill>
                     <a:srgbClr val="000000"/>
                   </a:solidFill>
@@ -2343,7 +2348,7 @@
             </a:ln>
             <a:extLst>
               <a:ext uri="{91240B29-F687-4f45-9708-019B960494DF}">
-                <a14:hiddenLine xmlns:a14="http://schemas.microsoft.com/office/drawing/2010/main" xmlns="" w="9525">
+                <a14:hiddenLine xmlns="" xmlns:a14="http://schemas.microsoft.com/office/drawing/2010/main" w="9525">
                   <a:solidFill>
                     <a:srgbClr val="000000"/>
                   </a:solidFill>
@@ -2433,7 +2438,7 @@
             </a:ln>
             <a:extLst>
               <a:ext uri="{91240B29-F687-4f45-9708-019B960494DF}">
-                <a14:hiddenLine xmlns:a14="http://schemas.microsoft.com/office/drawing/2010/main" xmlns="" w="9525">
+                <a14:hiddenLine xmlns="" xmlns:a14="http://schemas.microsoft.com/office/drawing/2010/main" w="9525">
                   <a:solidFill>
                     <a:srgbClr val="000000"/>
                   </a:solidFill>
@@ -2495,7 +2500,7 @@
             </a:ln>
             <a:extLst>
               <a:ext uri="{91240B29-F687-4f45-9708-019B960494DF}">
-                <a14:hiddenLine xmlns:a14="http://schemas.microsoft.com/office/drawing/2010/main" xmlns="" w="9525">
+                <a14:hiddenLine xmlns="" xmlns:a14="http://schemas.microsoft.com/office/drawing/2010/main" w="9525">
                   <a:solidFill>
                     <a:srgbClr val="000000"/>
                   </a:solidFill>
@@ -2557,7 +2562,7 @@
             </a:ln>
             <a:extLst>
               <a:ext uri="{91240B29-F687-4f45-9708-019B960494DF}">
-                <a14:hiddenLine xmlns:a14="http://schemas.microsoft.com/office/drawing/2010/main" xmlns="" w="9525">
+                <a14:hiddenLine xmlns="" xmlns:a14="http://schemas.microsoft.com/office/drawing/2010/main" w="9525">
                   <a:solidFill>
                     <a:srgbClr val="000000"/>
                   </a:solidFill>
@@ -2647,7 +2652,7 @@
             </a:ln>
             <a:extLst>
               <a:ext uri="{91240B29-F687-4f45-9708-019B960494DF}">
-                <a14:hiddenLine xmlns:a14="http://schemas.microsoft.com/office/drawing/2010/main" xmlns="" w="9525">
+                <a14:hiddenLine xmlns="" xmlns:a14="http://schemas.microsoft.com/office/drawing/2010/main" w="9525">
                   <a:solidFill>
                     <a:srgbClr val="000000"/>
                   </a:solidFill>
@@ -2715,7 +2720,7 @@
             </a:ln>
             <a:extLst>
               <a:ext uri="{91240B29-F687-4f45-9708-019B960494DF}">
-                <a14:hiddenLine xmlns:a14="http://schemas.microsoft.com/office/drawing/2010/main" xmlns="" w="9525">
+                <a14:hiddenLine xmlns="" xmlns:a14="http://schemas.microsoft.com/office/drawing/2010/main" w="9525">
                   <a:solidFill>
                     <a:srgbClr val="000000"/>
                   </a:solidFill>
@@ -2777,7 +2782,7 @@
             </a:ln>
             <a:extLst>
               <a:ext uri="{91240B29-F687-4f45-9708-019B960494DF}">
-                <a14:hiddenLine xmlns:a14="http://schemas.microsoft.com/office/drawing/2010/main" xmlns="" w="9525">
+                <a14:hiddenLine xmlns="" xmlns:a14="http://schemas.microsoft.com/office/drawing/2010/main" w="9525">
                   <a:solidFill>
                     <a:srgbClr val="000000"/>
                   </a:solidFill>
@@ -2867,7 +2872,7 @@
             </a:ln>
             <a:extLst>
               <a:ext uri="{91240B29-F687-4f45-9708-019B960494DF}">
-                <a14:hiddenLine xmlns:a14="http://schemas.microsoft.com/office/drawing/2010/main" xmlns="" w="9525">
+                <a14:hiddenLine xmlns="" xmlns:a14="http://schemas.microsoft.com/office/drawing/2010/main" w="9525">
                   <a:solidFill>
                     <a:srgbClr val="000000"/>
                   </a:solidFill>
@@ -2929,7 +2934,7 @@
             </a:ln>
             <a:extLst>
               <a:ext uri="{91240B29-F687-4f45-9708-019B960494DF}">
-                <a14:hiddenLine xmlns:a14="http://schemas.microsoft.com/office/drawing/2010/main" xmlns="" w="9525">
+                <a14:hiddenLine xmlns="" xmlns:a14="http://schemas.microsoft.com/office/drawing/2010/main" w="9525">
                   <a:solidFill>
                     <a:srgbClr val="000000"/>
                   </a:solidFill>
@@ -3019,7 +3024,7 @@
             </a:ln>
             <a:extLst>
               <a:ext uri="{91240B29-F687-4f45-9708-019B960494DF}">
-                <a14:hiddenLine xmlns:a14="http://schemas.microsoft.com/office/drawing/2010/main" xmlns="" w="9525">
+                <a14:hiddenLine xmlns="" xmlns:a14="http://schemas.microsoft.com/office/drawing/2010/main" w="9525">
                   <a:solidFill>
                     <a:srgbClr val="000000"/>
                   </a:solidFill>
@@ -3081,7 +3086,7 @@
             </a:ln>
             <a:extLst>
               <a:ext uri="{91240B29-F687-4f45-9708-019B960494DF}">
-                <a14:hiddenLine xmlns:a14="http://schemas.microsoft.com/office/drawing/2010/main" xmlns="" w="9525">
+                <a14:hiddenLine xmlns="" xmlns:a14="http://schemas.microsoft.com/office/drawing/2010/main" w="9525">
                   <a:solidFill>
                     <a:srgbClr val="000000"/>
                   </a:solidFill>
@@ -3171,7 +3176,7 @@
             </a:ln>
             <a:extLst>
               <a:ext uri="{91240B29-F687-4f45-9708-019B960494DF}">
-                <a14:hiddenLine xmlns:a14="http://schemas.microsoft.com/office/drawing/2010/main" xmlns="" w="9525">
+                <a14:hiddenLine xmlns="" xmlns:a14="http://schemas.microsoft.com/office/drawing/2010/main" w="9525">
                   <a:solidFill>
                     <a:srgbClr val="000000"/>
                   </a:solidFill>
@@ -3205,7 +3210,7 @@
             </a:ln>
             <a:extLst>
               <a:ext uri="{91240B29-F687-4f45-9708-019B960494DF}">
-                <a14:hiddenLine xmlns:a14="http://schemas.microsoft.com/office/drawing/2010/main" xmlns="" w="9525">
+                <a14:hiddenLine xmlns="" xmlns:a14="http://schemas.microsoft.com/office/drawing/2010/main" w="9525">
                   <a:solidFill>
                     <a:srgbClr val="000000"/>
                   </a:solidFill>
@@ -3270,7 +3275,7 @@
             </a:ln>
             <a:extLst>
               <a:ext uri="{91240B29-F687-4f45-9708-019B960494DF}">
-                <a14:hiddenLine xmlns:a14="http://schemas.microsoft.com/office/drawing/2010/main" xmlns="" w="9525">
+                <a14:hiddenLine xmlns="" xmlns:a14="http://schemas.microsoft.com/office/drawing/2010/main" w="9525">
                   <a:solidFill>
                     <a:srgbClr val="000000"/>
                   </a:solidFill>
@@ -3360,7 +3365,7 @@
             </a:ln>
             <a:extLst>
               <a:ext uri="{91240B29-F687-4f45-9708-019B960494DF}">
-                <a14:hiddenLine xmlns:a14="http://schemas.microsoft.com/office/drawing/2010/main" xmlns="" w="9525">
+                <a14:hiddenLine xmlns="" xmlns:a14="http://schemas.microsoft.com/office/drawing/2010/main" w="9525">
                   <a:solidFill>
                     <a:srgbClr val="000000"/>
                   </a:solidFill>
@@ -3422,7 +3427,7 @@
             </a:ln>
             <a:extLst>
               <a:ext uri="{91240B29-F687-4f45-9708-019B960494DF}">
-                <a14:hiddenLine xmlns:a14="http://schemas.microsoft.com/office/drawing/2010/main" xmlns="" w="9525">
+                <a14:hiddenLine xmlns="" xmlns:a14="http://schemas.microsoft.com/office/drawing/2010/main" w="9525">
                   <a:solidFill>
                     <a:srgbClr val="000000"/>
                   </a:solidFill>
@@ -3512,7 +3517,7 @@
             </a:ln>
             <a:extLst>
               <a:ext uri="{91240B29-F687-4f45-9708-019B960494DF}">
-                <a14:hiddenLine xmlns:a14="http://schemas.microsoft.com/office/drawing/2010/main" xmlns="" w="9525">
+                <a14:hiddenLine xmlns="" xmlns:a14="http://schemas.microsoft.com/office/drawing/2010/main" w="9525">
                   <a:solidFill>
                     <a:srgbClr val="000000"/>
                   </a:solidFill>
@@ -3602,7 +3607,7 @@
             </a:ln>
             <a:extLst>
               <a:ext uri="{91240B29-F687-4f45-9708-019B960494DF}">
-                <a14:hiddenLine xmlns:a14="http://schemas.microsoft.com/office/drawing/2010/main" xmlns="" w="9525">
+                <a14:hiddenLine xmlns="" xmlns:a14="http://schemas.microsoft.com/office/drawing/2010/main" w="9525">
                   <a:solidFill>
                     <a:srgbClr val="000000"/>
                   </a:solidFill>
@@ -3667,7 +3672,7 @@
             </a:ln>
             <a:extLst>
               <a:ext uri="{91240B29-F687-4f45-9708-019B960494DF}">
-                <a14:hiddenLine xmlns:a14="http://schemas.microsoft.com/office/drawing/2010/main" xmlns="" w="9525">
+                <a14:hiddenLine xmlns="" xmlns:a14="http://schemas.microsoft.com/office/drawing/2010/main" w="9525">
                   <a:solidFill>
                     <a:srgbClr val="000000"/>
                   </a:solidFill>
@@ -3729,7 +3734,7 @@
             </a:ln>
             <a:extLst>
               <a:ext uri="{91240B29-F687-4f45-9708-019B960494DF}">
-                <a14:hiddenLine xmlns:a14="http://schemas.microsoft.com/office/drawing/2010/main" xmlns="" w="9525">
+                <a14:hiddenLine xmlns="" xmlns:a14="http://schemas.microsoft.com/office/drawing/2010/main" w="9525">
                   <a:solidFill>
                     <a:srgbClr val="000000"/>
                   </a:solidFill>
@@ -3819,7 +3824,7 @@
             </a:ln>
             <a:extLst>
               <a:ext uri="{91240B29-F687-4f45-9708-019B960494DF}">
-                <a14:hiddenLine xmlns:a14="http://schemas.microsoft.com/office/drawing/2010/main" xmlns="" w="9525">
+                <a14:hiddenLine xmlns="" xmlns:a14="http://schemas.microsoft.com/office/drawing/2010/main" w="9525">
                   <a:solidFill>
                     <a:srgbClr val="000000"/>
                   </a:solidFill>
@@ -3909,7 +3914,7 @@
             </a:ln>
             <a:extLst>
               <a:ext uri="{91240B29-F687-4f45-9708-019B960494DF}">
-                <a14:hiddenLine xmlns:a14="http://schemas.microsoft.com/office/drawing/2010/main" xmlns="" w="9525">
+                <a14:hiddenLine xmlns="" xmlns:a14="http://schemas.microsoft.com/office/drawing/2010/main" w="9525">
                   <a:solidFill>
                     <a:srgbClr val="000000"/>
                   </a:solidFill>
@@ -3971,7 +3976,7 @@
             </a:ln>
             <a:extLst>
               <a:ext uri="{91240B29-F687-4f45-9708-019B960494DF}">
-                <a14:hiddenLine xmlns:a14="http://schemas.microsoft.com/office/drawing/2010/main" xmlns="" w="9525">
+                <a14:hiddenLine xmlns="" xmlns:a14="http://schemas.microsoft.com/office/drawing/2010/main" w="9525">
                   <a:solidFill>
                     <a:srgbClr val="000000"/>
                   </a:solidFill>
@@ -4091,7 +4096,7 @@
             </a:ln>
             <a:extLst>
               <a:ext uri="{91240B29-F687-4f45-9708-019B960494DF}">
-                <a14:hiddenLine xmlns:a14="http://schemas.microsoft.com/office/drawing/2010/main" xmlns="" w="9525">
+                <a14:hiddenLine xmlns="" xmlns:a14="http://schemas.microsoft.com/office/drawing/2010/main" w="9525">
                   <a:solidFill>
                     <a:srgbClr val="000000"/>
                   </a:solidFill>
@@ -4159,7 +4164,7 @@
             </a:ln>
             <a:extLst>
               <a:ext uri="{91240B29-F687-4f45-9708-019B960494DF}">
-                <a14:hiddenLine xmlns:a14="http://schemas.microsoft.com/office/drawing/2010/main" xmlns="" w="9525">
+                <a14:hiddenLine xmlns="" xmlns:a14="http://schemas.microsoft.com/office/drawing/2010/main" w="9525">
                   <a:solidFill>
                     <a:srgbClr val="000000"/>
                   </a:solidFill>
@@ -4249,7 +4254,7 @@
             </a:ln>
             <a:extLst>
               <a:ext uri="{91240B29-F687-4f45-9708-019B960494DF}">
-                <a14:hiddenLine xmlns:a14="http://schemas.microsoft.com/office/drawing/2010/main" xmlns="" w="9525">
+                <a14:hiddenLine xmlns="" xmlns:a14="http://schemas.microsoft.com/office/drawing/2010/main" w="9525">
                   <a:solidFill>
                     <a:srgbClr val="000000"/>
                   </a:solidFill>
@@ -8971,7 +8976,7 @@
           <a:noFill/>
           <a:extLst>
             <a:ext uri="{909E8E84-426E-40dd-AFC4-6F175D3DCCD1}">
-              <a14:hiddenFill xmlns:a14="http://schemas.microsoft.com/office/drawing/2010/main" xmlns="">
+              <a14:hiddenFill xmlns="" xmlns:a14="http://schemas.microsoft.com/office/drawing/2010/main">
                 <a:solidFill>
                   <a:srgbClr val="FFFFFF"/>
                 </a:solidFill>
@@ -9045,7 +9050,7 @@
               </a:ln>
               <a:extLst>
                 <a:ext uri="{91240B29-F687-4f45-9708-019B960494DF}">
-                  <a14:hiddenLine xmlns:a14="http://schemas.microsoft.com/office/drawing/2010/main" xmlns="" w="9525">
+                  <a14:hiddenLine xmlns="" xmlns:a14="http://schemas.microsoft.com/office/drawing/2010/main" w="9525">
                     <a:solidFill>
                       <a:srgbClr val="000000"/>
                     </a:solidFill>
@@ -9135,7 +9140,7 @@
               </a:ln>
               <a:extLst>
                 <a:ext uri="{91240B29-F687-4f45-9708-019B960494DF}">
-                  <a14:hiddenLine xmlns:a14="http://schemas.microsoft.com/office/drawing/2010/main" xmlns="" w="9525">
+                  <a14:hiddenLine xmlns="" xmlns:a14="http://schemas.microsoft.com/office/drawing/2010/main" w="9525">
                     <a:solidFill>
                       <a:srgbClr val="000000"/>
                     </a:solidFill>
@@ -9225,7 +9230,7 @@
               </a:ln>
               <a:extLst>
                 <a:ext uri="{91240B29-F687-4f45-9708-019B960494DF}">
-                  <a14:hiddenLine xmlns:a14="http://schemas.microsoft.com/office/drawing/2010/main" xmlns="" w="9525">
+                  <a14:hiddenLine xmlns="" xmlns:a14="http://schemas.microsoft.com/office/drawing/2010/main" w="9525">
                     <a:solidFill>
                       <a:srgbClr val="000000"/>
                     </a:solidFill>
@@ -9287,7 +9292,7 @@
               </a:ln>
               <a:extLst>
                 <a:ext uri="{91240B29-F687-4f45-9708-019B960494DF}">
-                  <a14:hiddenLine xmlns:a14="http://schemas.microsoft.com/office/drawing/2010/main" xmlns="" w="9525">
+                  <a14:hiddenLine xmlns="" xmlns:a14="http://schemas.microsoft.com/office/drawing/2010/main" w="9525">
                     <a:solidFill>
                       <a:srgbClr val="000000"/>
                     </a:solidFill>
@@ -9377,7 +9382,7 @@
               </a:ln>
               <a:extLst>
                 <a:ext uri="{91240B29-F687-4f45-9708-019B960494DF}">
-                  <a14:hiddenLine xmlns:a14="http://schemas.microsoft.com/office/drawing/2010/main" xmlns="" w="9525">
+                  <a14:hiddenLine xmlns="" xmlns:a14="http://schemas.microsoft.com/office/drawing/2010/main" w="9525">
                     <a:solidFill>
                       <a:srgbClr val="000000"/>
                     </a:solidFill>
@@ -9439,7 +9444,7 @@
               </a:ln>
               <a:extLst>
                 <a:ext uri="{91240B29-F687-4f45-9708-019B960494DF}">
-                  <a14:hiddenLine xmlns:a14="http://schemas.microsoft.com/office/drawing/2010/main" xmlns="" w="9525">
+                  <a14:hiddenLine xmlns="" xmlns:a14="http://schemas.microsoft.com/office/drawing/2010/main" w="9525">
                     <a:solidFill>
                       <a:srgbClr val="000000"/>
                     </a:solidFill>
@@ -9501,7 +9506,7 @@
               </a:ln>
               <a:extLst>
                 <a:ext uri="{91240B29-F687-4f45-9708-019B960494DF}">
-                  <a14:hiddenLine xmlns:a14="http://schemas.microsoft.com/office/drawing/2010/main" xmlns="" w="9525">
+                  <a14:hiddenLine xmlns="" xmlns:a14="http://schemas.microsoft.com/office/drawing/2010/main" w="9525">
                     <a:solidFill>
                       <a:srgbClr val="000000"/>
                     </a:solidFill>
@@ -9591,7 +9596,7 @@
               </a:ln>
               <a:extLst>
                 <a:ext uri="{91240B29-F687-4f45-9708-019B960494DF}">
-                  <a14:hiddenLine xmlns:a14="http://schemas.microsoft.com/office/drawing/2010/main" xmlns="" w="9525">
+                  <a14:hiddenLine xmlns="" xmlns:a14="http://schemas.microsoft.com/office/drawing/2010/main" w="9525">
                     <a:solidFill>
                       <a:srgbClr val="000000"/>
                     </a:solidFill>
@@ -9681,7 +9686,7 @@
               </a:ln>
               <a:extLst>
                 <a:ext uri="{91240B29-F687-4f45-9708-019B960494DF}">
-                  <a14:hiddenLine xmlns:a14="http://schemas.microsoft.com/office/drawing/2010/main" xmlns="" w="9525">
+                  <a14:hiddenLine xmlns="" xmlns:a14="http://schemas.microsoft.com/office/drawing/2010/main" w="9525">
                     <a:solidFill>
                       <a:srgbClr val="000000"/>
                     </a:solidFill>
@@ -9743,7 +9748,7 @@
               </a:ln>
               <a:extLst>
                 <a:ext uri="{91240B29-F687-4f45-9708-019B960494DF}">
-                  <a14:hiddenLine xmlns:a14="http://schemas.microsoft.com/office/drawing/2010/main" xmlns="" w="9525">
+                  <a14:hiddenLine xmlns="" xmlns:a14="http://schemas.microsoft.com/office/drawing/2010/main" w="9525">
                     <a:solidFill>
                       <a:srgbClr val="000000"/>
                     </a:solidFill>
@@ -9853,7 +9858,7 @@
               </a:ln>
               <a:extLst>
                 <a:ext uri="{91240B29-F687-4f45-9708-019B960494DF}">
-                  <a14:hiddenLine xmlns:a14="http://schemas.microsoft.com/office/drawing/2010/main" xmlns="" w="9525">
+                  <a14:hiddenLine xmlns="" xmlns:a14="http://schemas.microsoft.com/office/drawing/2010/main" w="9525">
                     <a:solidFill>
                       <a:srgbClr val="000000"/>
                     </a:solidFill>
@@ -9937,7 +9942,7 @@
               </a:ln>
               <a:extLst>
                 <a:ext uri="{91240B29-F687-4f45-9708-019B960494DF}">
-                  <a14:hiddenLine xmlns:a14="http://schemas.microsoft.com/office/drawing/2010/main" xmlns="" w="9525">
+                  <a14:hiddenLine xmlns="" xmlns:a14="http://schemas.microsoft.com/office/drawing/2010/main" w="9525">
                     <a:solidFill>
                       <a:srgbClr val="000000"/>
                     </a:solidFill>
@@ -9999,7 +10004,7 @@
               </a:ln>
               <a:extLst>
                 <a:ext uri="{91240B29-F687-4f45-9708-019B960494DF}">
-                  <a14:hiddenLine xmlns:a14="http://schemas.microsoft.com/office/drawing/2010/main" xmlns="" w="9525">
+                  <a14:hiddenLine xmlns="" xmlns:a14="http://schemas.microsoft.com/office/drawing/2010/main" w="9525">
                     <a:solidFill>
                       <a:srgbClr val="000000"/>
                     </a:solidFill>
@@ -10061,7 +10066,7 @@
               </a:ln>
               <a:extLst>
                 <a:ext uri="{91240B29-F687-4f45-9708-019B960494DF}">
-                  <a14:hiddenLine xmlns:a14="http://schemas.microsoft.com/office/drawing/2010/main" xmlns="" w="9525">
+                  <a14:hiddenLine xmlns="" xmlns:a14="http://schemas.microsoft.com/office/drawing/2010/main" w="9525">
                     <a:solidFill>
                       <a:srgbClr val="000000"/>
                     </a:solidFill>
@@ -10151,7 +10156,7 @@
               </a:ln>
               <a:extLst>
                 <a:ext uri="{91240B29-F687-4f45-9708-019B960494DF}">
-                  <a14:hiddenLine xmlns:a14="http://schemas.microsoft.com/office/drawing/2010/main" xmlns="" w="9525">
+                  <a14:hiddenLine xmlns="" xmlns:a14="http://schemas.microsoft.com/office/drawing/2010/main" w="9525">
                     <a:solidFill>
                       <a:srgbClr val="000000"/>
                     </a:solidFill>
@@ -10185,7 +10190,7 @@
               </a:ln>
               <a:extLst>
                 <a:ext uri="{91240B29-F687-4f45-9708-019B960494DF}">
-                  <a14:hiddenLine xmlns:a14="http://schemas.microsoft.com/office/drawing/2010/main" xmlns="" w="9525">
+                  <a14:hiddenLine xmlns="" xmlns:a14="http://schemas.microsoft.com/office/drawing/2010/main" w="9525">
                     <a:solidFill>
                       <a:srgbClr val="000000"/>
                     </a:solidFill>
@@ -10250,7 +10255,7 @@
               </a:ln>
               <a:extLst>
                 <a:ext uri="{91240B29-F687-4f45-9708-019B960494DF}">
-                  <a14:hiddenLine xmlns:a14="http://schemas.microsoft.com/office/drawing/2010/main" xmlns="" w="9525">
+                  <a14:hiddenLine xmlns="" xmlns:a14="http://schemas.microsoft.com/office/drawing/2010/main" w="9525">
                     <a:solidFill>
                       <a:srgbClr val="000000"/>
                     </a:solidFill>
@@ -10340,7 +10345,7 @@
               </a:ln>
               <a:extLst>
                 <a:ext uri="{91240B29-F687-4f45-9708-019B960494DF}">
-                  <a14:hiddenLine xmlns:a14="http://schemas.microsoft.com/office/drawing/2010/main" xmlns="" w="9525">
+                  <a14:hiddenLine xmlns="" xmlns:a14="http://schemas.microsoft.com/office/drawing/2010/main" w="9525">
                     <a:solidFill>
                       <a:srgbClr val="000000"/>
                     </a:solidFill>
@@ -10402,7 +10407,7 @@
               </a:ln>
               <a:extLst>
                 <a:ext uri="{91240B29-F687-4f45-9708-019B960494DF}">
-                  <a14:hiddenLine xmlns:a14="http://schemas.microsoft.com/office/drawing/2010/main" xmlns="" w="9525">
+                  <a14:hiddenLine xmlns="" xmlns:a14="http://schemas.microsoft.com/office/drawing/2010/main" w="9525">
                     <a:solidFill>
                       <a:srgbClr val="000000"/>
                     </a:solidFill>
@@ -10492,7 +10497,7 @@
               </a:ln>
               <a:extLst>
                 <a:ext uri="{91240B29-F687-4f45-9708-019B960494DF}">
-                  <a14:hiddenLine xmlns:a14="http://schemas.microsoft.com/office/drawing/2010/main" xmlns="" w="9525">
+                  <a14:hiddenLine xmlns="" xmlns:a14="http://schemas.microsoft.com/office/drawing/2010/main" w="9525">
                     <a:solidFill>
                       <a:srgbClr val="000000"/>
                     </a:solidFill>
@@ -10557,7 +10562,7 @@
               </a:ln>
               <a:extLst>
                 <a:ext uri="{91240B29-F687-4f45-9708-019B960494DF}">
-                  <a14:hiddenLine xmlns:a14="http://schemas.microsoft.com/office/drawing/2010/main" xmlns="" w="9525">
+                  <a14:hiddenLine xmlns="" xmlns:a14="http://schemas.microsoft.com/office/drawing/2010/main" w="9525">
                     <a:solidFill>
                       <a:srgbClr val="000000"/>
                     </a:solidFill>
@@ -10619,7 +10624,7 @@
               </a:ln>
               <a:extLst>
                 <a:ext uri="{91240B29-F687-4f45-9708-019B960494DF}">
-                  <a14:hiddenLine xmlns:a14="http://schemas.microsoft.com/office/drawing/2010/main" xmlns="" w="9525">
+                  <a14:hiddenLine xmlns="" xmlns:a14="http://schemas.microsoft.com/office/drawing/2010/main" w="9525">
                     <a:solidFill>
                       <a:srgbClr val="000000"/>
                     </a:solidFill>
@@ -10709,7 +10714,7 @@
               </a:ln>
               <a:extLst>
                 <a:ext uri="{91240B29-F687-4f45-9708-019B960494DF}">
-                  <a14:hiddenLine xmlns:a14="http://schemas.microsoft.com/office/drawing/2010/main" xmlns="" w="9525">
+                  <a14:hiddenLine xmlns="" xmlns:a14="http://schemas.microsoft.com/office/drawing/2010/main" w="9525">
                     <a:solidFill>
                       <a:srgbClr val="000000"/>
                     </a:solidFill>
@@ -10799,7 +10804,7 @@
               </a:ln>
               <a:extLst>
                 <a:ext uri="{91240B29-F687-4f45-9708-019B960494DF}">
-                  <a14:hiddenLine xmlns:a14="http://schemas.microsoft.com/office/drawing/2010/main" xmlns="" w="9525">
+                  <a14:hiddenLine xmlns="" xmlns:a14="http://schemas.microsoft.com/office/drawing/2010/main" w="9525">
                     <a:solidFill>
                       <a:srgbClr val="000000"/>
                     </a:solidFill>
@@ -10864,7 +10869,7 @@
               </a:ln>
               <a:extLst>
                 <a:ext uri="{91240B29-F687-4f45-9708-019B960494DF}">
-                  <a14:hiddenLine xmlns:a14="http://schemas.microsoft.com/office/drawing/2010/main" xmlns="" w="9525">
+                  <a14:hiddenLine xmlns="" xmlns:a14="http://schemas.microsoft.com/office/drawing/2010/main" w="9525">
                     <a:solidFill>
                       <a:srgbClr val="000000"/>
                     </a:solidFill>
@@ -10984,7 +10989,7 @@
               </a:ln>
               <a:extLst>
                 <a:ext uri="{91240B29-F687-4f45-9708-019B960494DF}">
-                  <a14:hiddenLine xmlns:a14="http://schemas.microsoft.com/office/drawing/2010/main" xmlns="" w="9525">
+                  <a14:hiddenLine xmlns="" xmlns:a14="http://schemas.microsoft.com/office/drawing/2010/main" w="9525">
                     <a:solidFill>
                       <a:srgbClr val="000000"/>
                     </a:solidFill>
@@ -11082,7 +11087,7 @@
               </a:ln>
               <a:extLst>
                 <a:ext uri="{91240B29-F687-4f45-9708-019B960494DF}">
-                  <a14:hiddenLine xmlns:a14="http://schemas.microsoft.com/office/drawing/2010/main" xmlns="" w="9525">
+                  <a14:hiddenLine xmlns="" xmlns:a14="http://schemas.microsoft.com/office/drawing/2010/main" w="9525">
                     <a:solidFill>
                       <a:srgbClr val="000000"/>
                     </a:solidFill>
@@ -11197,7 +11202,7 @@
               </a:ln>
               <a:extLst>
                 <a:ext uri="{91240B29-F687-4f45-9708-019B960494DF}">
-                  <a14:hiddenLine xmlns:a14="http://schemas.microsoft.com/office/drawing/2010/main" xmlns="" w="9525">
+                  <a14:hiddenLine xmlns="" xmlns:a14="http://schemas.microsoft.com/office/drawing/2010/main" w="9525">
                     <a:solidFill>
                       <a:srgbClr val="000000"/>
                     </a:solidFill>
@@ -11287,7 +11292,7 @@
               </a:ln>
               <a:extLst>
                 <a:ext uri="{91240B29-F687-4f45-9708-019B960494DF}">
-                  <a14:hiddenLine xmlns:a14="http://schemas.microsoft.com/office/drawing/2010/main" xmlns="" w="9525">
+                  <a14:hiddenLine xmlns="" xmlns:a14="http://schemas.microsoft.com/office/drawing/2010/main" w="9525">
                     <a:solidFill>
                       <a:srgbClr val="000000"/>
                     </a:solidFill>
@@ -11352,7 +11357,7 @@
               </a:ln>
               <a:extLst>
                 <a:ext uri="{91240B29-F687-4f45-9708-019B960494DF}">
-                  <a14:hiddenLine xmlns:a14="http://schemas.microsoft.com/office/drawing/2010/main" xmlns="" w="9525">
+                  <a14:hiddenLine xmlns="" xmlns:a14="http://schemas.microsoft.com/office/drawing/2010/main" w="9525">
                     <a:solidFill>
                       <a:srgbClr val="000000"/>
                     </a:solidFill>
@@ -11442,7 +11447,7 @@
               </a:ln>
               <a:extLst>
                 <a:ext uri="{91240B29-F687-4f45-9708-019B960494DF}">
-                  <a14:hiddenLine xmlns:a14="http://schemas.microsoft.com/office/drawing/2010/main" xmlns="" w="9525">
+                  <a14:hiddenLine xmlns="" xmlns:a14="http://schemas.microsoft.com/office/drawing/2010/main" w="9525">
                     <a:solidFill>
                       <a:srgbClr val="000000"/>
                     </a:solidFill>
@@ -11510,7 +11515,7 @@
               </a:ln>
               <a:extLst>
                 <a:ext uri="{91240B29-F687-4f45-9708-019B960494DF}">
-                  <a14:hiddenLine xmlns:a14="http://schemas.microsoft.com/office/drawing/2010/main" xmlns="" w="9525">
+                  <a14:hiddenLine xmlns="" xmlns:a14="http://schemas.microsoft.com/office/drawing/2010/main" w="9525">
                     <a:solidFill>
                       <a:srgbClr val="000000"/>
                     </a:solidFill>
@@ -11600,7 +11605,7 @@
               </a:ln>
               <a:extLst>
                 <a:ext uri="{91240B29-F687-4f45-9708-019B960494DF}">
-                  <a14:hiddenLine xmlns:a14="http://schemas.microsoft.com/office/drawing/2010/main" xmlns="" w="9525">
+                  <a14:hiddenLine xmlns="" xmlns:a14="http://schemas.microsoft.com/office/drawing/2010/main" w="9525">
                     <a:solidFill>
                       <a:srgbClr val="000000"/>
                     </a:solidFill>
@@ -11668,7 +11673,7 @@
               </a:ln>
               <a:extLst>
                 <a:ext uri="{91240B29-F687-4f45-9708-019B960494DF}">
-                  <a14:hiddenLine xmlns:a14="http://schemas.microsoft.com/office/drawing/2010/main" xmlns="" w="9525">
+                  <a14:hiddenLine xmlns="" xmlns:a14="http://schemas.microsoft.com/office/drawing/2010/main" w="9525">
                     <a:solidFill>
                       <a:srgbClr val="000000"/>
                     </a:solidFill>
@@ -11758,7 +11763,7 @@
               </a:ln>
               <a:extLst>
                 <a:ext uri="{91240B29-F687-4f45-9708-019B960494DF}">
-                  <a14:hiddenLine xmlns:a14="http://schemas.microsoft.com/office/drawing/2010/main" xmlns="" w="9525">
+                  <a14:hiddenLine xmlns="" xmlns:a14="http://schemas.microsoft.com/office/drawing/2010/main" w="9525">
                     <a:solidFill>
                       <a:srgbClr val="000000"/>
                     </a:solidFill>
@@ -11792,7 +11797,7 @@
               </a:ln>
               <a:extLst>
                 <a:ext uri="{91240B29-F687-4f45-9708-019B960494DF}">
-                  <a14:hiddenLine xmlns:a14="http://schemas.microsoft.com/office/drawing/2010/main" xmlns="" w="9525">
+                  <a14:hiddenLine xmlns="" xmlns:a14="http://schemas.microsoft.com/office/drawing/2010/main" w="9525">
                     <a:solidFill>
                       <a:srgbClr val="000000"/>
                     </a:solidFill>
@@ -12503,17 +12508,22 @@
         <p:spPr>
           <a:xfrm>
             <a:off x="1141413" y="618518"/>
-            <a:ext cx="9905998" cy="1478570"/>
+            <a:ext cx="3251911" cy="1478570"/>
           </a:xfrm>
         </p:spPr>
         <p:txBody>
-          <a:bodyPr/>
+          <a:bodyPr>
+            <a:normAutofit fontScale="90000"/>
+          </a:bodyPr>
           <a:lstStyle/>
           <a:p>
             <a:r>
               <a:rPr lang="fi-FI" dirty="0"/>
               <a:t>User </a:t>
             </a:r>
+            <a:br>
+              <a:rPr lang="fi-FI" dirty="0"/>
+            </a:br>
             <a:r>
               <a:rPr lang="fi-FI" dirty="0" err="1"/>
               <a:t>requirement</a:t>
@@ -12522,6 +12532,9 @@
               <a:rPr lang="fi-FI" dirty="0"/>
               <a:t> </a:t>
             </a:r>
+            <a:br>
+              <a:rPr lang="fi-FI" dirty="0"/>
+            </a:br>
             <a:r>
               <a:rPr lang="fi-FI" dirty="0" err="1"/>
               <a:t>definitions</a:t>
@@ -12532,10 +12545,10 @@
       </p:sp>
       <p:pic>
         <p:nvPicPr>
-          <p:cNvPr id="7" name="Picture 6">
+          <p:cNvPr id="4" name="Picture 3">
             <a:extLst>
               <a:ext uri="{FF2B5EF4-FFF2-40B4-BE49-F238E27FC236}">
-                <a16:creationId xmlns:a16="http://schemas.microsoft.com/office/drawing/2014/main" id="{CA6A017F-A8F5-4844-87BD-B5A314545EE4}"/>
+                <a16:creationId xmlns:a16="http://schemas.microsoft.com/office/drawing/2014/main" id="{E03E11BC-00DA-5643-9E93-439C30BB0E34}"/>
               </a:ext>
             </a:extLst>
           </p:cNvPr>
@@ -12552,8 +12565,8 @@
         </p:blipFill>
         <p:spPr>
           <a:xfrm>
-            <a:off x="1141412" y="1747013"/>
-            <a:ext cx="8901747" cy="4492470"/>
+            <a:off x="5703886" y="157655"/>
+            <a:ext cx="5382489" cy="6520355"/>
           </a:xfrm>
           <a:prstGeom prst="rect">
             <a:avLst/>
@@ -12734,7 +12747,7 @@
         <p:spPr/>
         <p:txBody>
           <a:bodyPr>
-            <a:normAutofit/>
+            <a:normAutofit fontScale="92500" lnSpcReduction="20000"/>
           </a:bodyPr>
           <a:lstStyle/>
           <a:p>
@@ -12797,6 +12810,13 @@
             </a:r>
           </a:p>
           <a:p>
+            <a:pPr lvl="1"/>
+            <a:r>
+              <a:rPr lang="fi-FI" dirty="0"/>
+              <a:t>Etc.</a:t>
+            </a:r>
+          </a:p>
+          <a:p>
             <a:r>
               <a:rPr lang="fi-FI" dirty="0" err="1"/>
               <a:t>Non-Functional</a:t>
@@ -12818,6 +12838,21 @@
             <a:r>
               <a:rPr lang="de" dirty="0"/>
               <a:t>eine benutzerfreundliche Oberfläche bieten</a:t>
+            </a:r>
+          </a:p>
+          <a:p>
+            <a:pPr lvl="1"/>
+            <a:r>
+              <a:rPr lang="fi-FI" dirty="0"/>
+              <a:t>E</a:t>
+            </a:r>
+            <a:r>
+              <a:rPr lang="de" dirty="0" err="1"/>
+              <a:t>tc</a:t>
+            </a:r>
+            <a:r>
+              <a:rPr lang="de" dirty="0"/>
+              <a:t>.</a:t>
             </a:r>
           </a:p>
           <a:p>

</xml_diff>